<commit_message>
need to fix the category titles, currently have the list in the wrong order
</commit_message>
<xml_diff>
--- a/ppt/Youtube Analytics from 2011 in the U.pptx
+++ b/ppt/Youtube Analytics from 2011 in the U.pptx
@@ -106,6 +106,11 @@
       </a:defRPr>
     </a:lvl9pPr>
   </p:defaultTextStyle>
+  <p:extLst>
+    <p:ext uri="{EFAFB233-063F-42B5-8137-9DF3F51BA10A}">
+      <p15:sldGuideLst xmlns:p15="http://schemas.microsoft.com/office/powerpoint/2012/main"/>
+    </p:ext>
+  </p:extLst>
 </p:presentation>
 </file>
 
@@ -256,7 +261,7 @@
           <a:p>
             <a:fld id="{0DAF61AA-5A98-4049-A93E-477E5505141A}" type="datetimeFigureOut">
               <a:rPr lang="en-US" smtClean="0"/>
-              <a:t>6/26/2023</a:t>
+              <a:t>6/27/2023</a:t>
             </a:fld>
             <a:endParaRPr lang="en-US" dirty="0"/>
           </a:p>
@@ -454,7 +459,7 @@
           <a:p>
             <a:fld id="{0DAF61AA-5A98-4049-A93E-477E5505141A}" type="datetimeFigureOut">
               <a:rPr lang="en-US" smtClean="0"/>
-              <a:t>6/26/2023</a:t>
+              <a:t>6/27/2023</a:t>
             </a:fld>
             <a:endParaRPr lang="en-US"/>
           </a:p>
@@ -662,7 +667,7 @@
           <a:p>
             <a:fld id="{0DAF61AA-5A98-4049-A93E-477E5505141A}" type="datetimeFigureOut">
               <a:rPr lang="en-US" smtClean="0"/>
-              <a:t>6/26/2023</a:t>
+              <a:t>6/27/2023</a:t>
             </a:fld>
             <a:endParaRPr lang="en-US"/>
           </a:p>
@@ -860,7 +865,7 @@
           <a:p>
             <a:fld id="{0DAF61AA-5A98-4049-A93E-477E5505141A}" type="datetimeFigureOut">
               <a:rPr lang="en-US" smtClean="0"/>
-              <a:t>6/26/2023</a:t>
+              <a:t>6/27/2023</a:t>
             </a:fld>
             <a:endParaRPr lang="en-US"/>
           </a:p>
@@ -1135,7 +1140,7 @@
           <a:p>
             <a:fld id="{0DAF61AA-5A98-4049-A93E-477E5505141A}" type="datetimeFigureOut">
               <a:rPr lang="en-US" smtClean="0"/>
-              <a:t>6/26/2023</a:t>
+              <a:t>6/27/2023</a:t>
             </a:fld>
             <a:endParaRPr lang="en-US"/>
           </a:p>
@@ -1400,7 +1405,7 @@
           <a:p>
             <a:fld id="{0DAF61AA-5A98-4049-A93E-477E5505141A}" type="datetimeFigureOut">
               <a:rPr lang="en-US" smtClean="0"/>
-              <a:t>6/26/2023</a:t>
+              <a:t>6/27/2023</a:t>
             </a:fld>
             <a:endParaRPr lang="en-US"/>
           </a:p>
@@ -1812,7 +1817,7 @@
           <a:p>
             <a:fld id="{0DAF61AA-5A98-4049-A93E-477E5505141A}" type="datetimeFigureOut">
               <a:rPr lang="en-US" smtClean="0"/>
-              <a:t>6/26/2023</a:t>
+              <a:t>6/27/2023</a:t>
             </a:fld>
             <a:endParaRPr lang="en-US"/>
           </a:p>
@@ -1953,7 +1958,7 @@
           <a:p>
             <a:fld id="{0DAF61AA-5A98-4049-A93E-477E5505141A}" type="datetimeFigureOut">
               <a:rPr lang="en-US" smtClean="0"/>
-              <a:t>6/26/2023</a:t>
+              <a:t>6/27/2023</a:t>
             </a:fld>
             <a:endParaRPr lang="en-US"/>
           </a:p>
@@ -2066,7 +2071,7 @@
           <a:p>
             <a:fld id="{0DAF61AA-5A98-4049-A93E-477E5505141A}" type="datetimeFigureOut">
               <a:rPr lang="en-US" smtClean="0"/>
-              <a:t>6/26/2023</a:t>
+              <a:t>6/27/2023</a:t>
             </a:fld>
             <a:endParaRPr lang="en-US"/>
           </a:p>
@@ -2377,7 +2382,7 @@
           <a:p>
             <a:fld id="{0DAF61AA-5A98-4049-A93E-477E5505141A}" type="datetimeFigureOut">
               <a:rPr lang="en-US" smtClean="0"/>
-              <a:t>6/26/2023</a:t>
+              <a:t>6/27/2023</a:t>
             </a:fld>
             <a:endParaRPr lang="en-US"/>
           </a:p>
@@ -2668,7 +2673,7 @@
           <a:p>
             <a:fld id="{0DAF61AA-5A98-4049-A93E-477E5505141A}" type="datetimeFigureOut">
               <a:rPr lang="en-US" smtClean="0"/>
-              <a:t>6/26/2023</a:t>
+              <a:t>6/27/2023</a:t>
             </a:fld>
             <a:endParaRPr lang="en-US"/>
           </a:p>
@@ -6356,7 +6361,7 @@
             <a:fld id="{0DAF61AA-5A98-4049-A93E-477E5505141A}" type="datetimeFigureOut">
               <a:rPr lang="en-US" smtClean="0"/>
               <a:pPr/>
-              <a:t>6/26/2023</a:t>
+              <a:t>6/27/2023</a:t>
             </a:fld>
             <a:endParaRPr lang="en-US" dirty="0"/>
           </a:p>
@@ -12161,10 +12166,10 @@
       </p:sp>
       <p:pic>
         <p:nvPicPr>
-          <p:cNvPr id="5" name="Picture 4">
+          <p:cNvPr id="6" name="Picture 5">
             <a:extLst>
               <a:ext uri="{FF2B5EF4-FFF2-40B4-BE49-F238E27FC236}">
-                <a16:creationId xmlns:a16="http://schemas.microsoft.com/office/drawing/2014/main" id="{26B71CEE-2B80-6188-F697-31FB841DD9BC}"/>
+                <a16:creationId xmlns:a16="http://schemas.microsoft.com/office/drawing/2014/main" id="{D749A48B-57C8-F32E-B769-1C9783DA70D3}"/>
               </a:ext>
             </a:extLst>
           </p:cNvPr>
@@ -12181,8 +12186,8 @@
         </p:blipFill>
         <p:spPr>
           <a:xfrm>
-            <a:off x="342444" y="0"/>
-            <a:ext cx="11507112" cy="6858000"/>
+            <a:off x="0" y="0"/>
+            <a:ext cx="12192000" cy="7058346"/>
           </a:xfrm>
           <a:prstGeom prst="rect">
             <a:avLst/>

</xml_diff>

<commit_message>
updated ppt for new chart
</commit_message>
<xml_diff>
--- a/ppt/Youtube Analytics from 2011 in the U.pptx
+++ b/ppt/Youtube Analytics from 2011 in the U.pptx
@@ -13467,10 +13467,10 @@
       </p:sp>
       <p:pic>
         <p:nvPicPr>
-          <p:cNvPr id="5" name="Picture 4">
+          <p:cNvPr id="8" name="Picture 7">
             <a:extLst>
               <a:ext uri="{FF2B5EF4-FFF2-40B4-BE49-F238E27FC236}">
-                <a16:creationId xmlns:a16="http://schemas.microsoft.com/office/drawing/2014/main" id="{3FB2480C-5EA9-3AF1-CE58-F14FBF4380ED}"/>
+                <a16:creationId xmlns:a16="http://schemas.microsoft.com/office/drawing/2014/main" id="{0272F5E4-D6C4-2144-3A65-4EB0A65381E1}"/>
               </a:ext>
             </a:extLst>
           </p:cNvPr>
@@ -13487,8 +13487,8 @@
         </p:blipFill>
         <p:spPr>
           <a:xfrm>
-            <a:off x="0" y="-1"/>
-            <a:ext cx="12192000" cy="6783875"/>
+            <a:off x="0" y="17213"/>
+            <a:ext cx="12192000" cy="6823574"/>
           </a:xfrm>
           <a:prstGeom prst="rect">
             <a:avLst/>

</xml_diff>

<commit_message>
final version prior to brief.
</commit_message>
<xml_diff>
--- a/ppt/Youtube Analytics from 2011 in the U.pptx
+++ b/ppt/Youtube Analytics from 2011 in the U.pptx
@@ -12887,70 +12887,77 @@
           <a:lstStyle/>
           <a:p>
             <a:r>
-              <a:rPr lang="en-US" dirty="0"/>
-              <a:t>Teammates contact info</a:t>
+              <a:rPr lang="en-US" sz="3000" dirty="0"/>
+              <a:t>Teammates’ contact info</a:t>
             </a:r>
           </a:p>
           <a:p>
             <a:pPr lvl="1"/>
             <a:r>
-              <a:rPr lang="en-US" dirty="0" err="1"/>
+              <a:rPr lang="en-US" sz="2600" dirty="0" err="1"/>
               <a:t>Joshlyn</a:t>
             </a:r>
             <a:r>
-              <a:rPr lang="en-US" dirty="0"/>
+              <a:rPr lang="en-US" sz="2600" dirty="0"/>
               <a:t> Jamerson: </a:t>
             </a:r>
             <a:r>
-              <a:rPr lang="en-US" dirty="0">
+              <a:rPr lang="en-US" sz="2600" dirty="0">
                 <a:hlinkClick r:id="rId2"/>
               </a:rPr>
               <a:t>joshlyn.Jamerson@spaceforce.mil</a:t>
             </a:r>
-            <a:endParaRPr lang="en-US" dirty="0"/>
+            <a:endParaRPr lang="en-US" sz="2600" dirty="0"/>
           </a:p>
           <a:p>
             <a:pPr lvl="1"/>
             <a:r>
-              <a:rPr lang="en-US" dirty="0"/>
+              <a:rPr lang="en-US" sz="2600" dirty="0"/>
               <a:t>Robert Auer: </a:t>
             </a:r>
             <a:r>
-              <a:rPr lang="en-US" dirty="0">
+              <a:rPr lang="en-US" sz="2600" dirty="0">
                 <a:hlinkClick r:id="rId3"/>
               </a:rPr>
               <a:t>Robert.auer@spaceforce.mil</a:t>
             </a:r>
-            <a:endParaRPr lang="en-US" dirty="0"/>
+            <a:endParaRPr lang="en-US" sz="2600" dirty="0"/>
           </a:p>
           <a:p>
             <a:pPr lvl="1"/>
             <a:r>
-              <a:rPr lang="en-US" dirty="0"/>
+              <a:rPr lang="en-US" sz="2600" dirty="0"/>
               <a:t>YJ Kim: </a:t>
             </a:r>
             <a:r>
-              <a:rPr lang="en-US" dirty="0">
+              <a:rPr lang="en-US" sz="2600" dirty="0">
                 <a:hlinkClick r:id="rId4"/>
               </a:rPr>
               <a:t>young.j.kim@socom.mil</a:t>
             </a:r>
-            <a:endParaRPr lang="en-US" dirty="0"/>
+            <a:endParaRPr lang="en-US" sz="2600" dirty="0"/>
           </a:p>
           <a:p>
             <a:pPr lvl="1"/>
             <a:r>
-              <a:rPr lang="en-US" dirty="0"/>
-              <a:t>Travis Lindeman: travis.lindeman@socom.mil</a:t>
+              <a:rPr lang="en-US" sz="2600" dirty="0"/>
+              <a:t>Travis Lindeman: </a:t>
             </a:r>
-          </a:p>
-          <a:p>
-            <a:endParaRPr lang="en-US" dirty="0"/>
-          </a:p>
-          <a:p>
             <a:r>
-              <a:rPr lang="en-US" dirty="0"/>
-              <a:t>Repository:</a:t>
+              <a:rPr lang="en-US" sz="2600" dirty="0">
+                <a:hlinkClick r:id="rId5"/>
+              </a:rPr>
+              <a:t>travis.lindeman@socom.mil</a:t>
+            </a:r>
+            <a:endParaRPr lang="en-US" sz="2600" dirty="0"/>
+          </a:p>
+          <a:p>
+            <a:endParaRPr lang="en-US" sz="2400" dirty="0"/>
+          </a:p>
+          <a:p>
+            <a:r>
+              <a:rPr lang="en-US" sz="3300" dirty="0"/>
+              <a:t>Repository link:</a:t>
             </a:r>
           </a:p>
           <a:p>
@@ -12958,21 +12965,36 @@
               <a:buNone/>
             </a:pPr>
             <a:r>
-              <a:rPr lang="en-US" dirty="0"/>
-              <a:t>  https://github.com/tralinde/tralinde_EDA_group_presentation</a:t>
+              <a:rPr lang="en-US" sz="2400" dirty="0"/>
+              <a:t>  </a:t>
             </a:r>
-          </a:p>
-          <a:p>
-            <a:endParaRPr lang="en-US" dirty="0"/>
-          </a:p>
-          <a:p>
-            <a:endParaRPr lang="en-US" dirty="0"/>
-          </a:p>
-          <a:p>
             <a:r>
-              <a:rPr lang="en-US" dirty="0"/>
-              <a:t>Dataset: https://www.kaggle.com/datasets/datasnaek/youtube-new</a:t>
+              <a:rPr lang="en-US" sz="2600" dirty="0"/>
+              <a:t>https://github.com/tralinde/tralinde_EDA_group_presentation</a:t>
             </a:r>
+          </a:p>
+          <a:p>
+            <a:endParaRPr lang="en-US" sz="2600" dirty="0"/>
+          </a:p>
+          <a:p>
+            <a:r>
+              <a:rPr lang="en-US" sz="3300" dirty="0"/>
+              <a:t>Dataset link: </a:t>
+            </a:r>
+          </a:p>
+          <a:p>
+            <a:pPr marL="0" indent="0">
+              <a:buNone/>
+            </a:pPr>
+            <a:r>
+              <a:rPr lang="en-US" sz="2400" dirty="0"/>
+              <a:t>  </a:t>
+            </a:r>
+            <a:r>
+              <a:rPr lang="en-US" sz="2600" dirty="0"/>
+              <a:t>https://www.kaggle.com/datasets/datasnaek/youtube-new</a:t>
+            </a:r>
+            <a:endParaRPr lang="en-US" sz="2400" dirty="0"/>
           </a:p>
         </p:txBody>
       </p:sp>
@@ -13241,6 +13263,12 @@
             </a:r>
           </a:p>
           <a:p>
+            <a:pPr marL="0" indent="0">
+              <a:buNone/>
+            </a:pPr>
+            <a:endParaRPr lang="en-US" dirty="0"/>
+          </a:p>
+          <a:p>
             <a:endParaRPr lang="en-US" dirty="0"/>
           </a:p>
           <a:p>
@@ -13373,6 +13401,12 @@
             <a:r>
               <a:rPr lang="en-US" dirty="0"/>
               <a:t>Video Id</a:t>
+            </a:r>
+          </a:p>
+          <a:p>
+            <a:r>
+              <a:rPr lang="en-US" dirty="0"/>
+              <a:t>Category </a:t>
             </a:r>
           </a:p>
         </p:txBody>
@@ -13728,10 +13762,10 @@
       </p:sp>
       <p:pic>
         <p:nvPicPr>
-          <p:cNvPr id="5" name="Picture 4">
+          <p:cNvPr id="6" name="Picture 5">
             <a:extLst>
               <a:ext uri="{FF2B5EF4-FFF2-40B4-BE49-F238E27FC236}">
-                <a16:creationId xmlns:a16="http://schemas.microsoft.com/office/drawing/2014/main" id="{46F8B2B2-2C53-A811-4EA4-6386E2A3BE58}"/>
+                <a16:creationId xmlns:a16="http://schemas.microsoft.com/office/drawing/2014/main" id="{1FF701B3-F298-3AB9-E43E-1162E592EB80}"/>
               </a:ext>
             </a:extLst>
           </p:cNvPr>
@@ -13748,8 +13782,8 @@
         </p:blipFill>
         <p:spPr>
           <a:xfrm>
-            <a:off x="195384" y="78154"/>
-            <a:ext cx="11774943" cy="6628405"/>
+            <a:off x="0" y="0"/>
+            <a:ext cx="12192000" cy="6849632"/>
           </a:xfrm>
           <a:prstGeom prst="rect">
             <a:avLst/>

</xml_diff>